<commit_message>
Added slide deck with problem statements etc.
</commit_message>
<xml_diff>
--- a/Team Feedback.pptx
+++ b/Team Feedback.pptx
@@ -300,7 +300,7 @@
           <a:p>
             <a:fld id="{746EF8ED-39D9-4E9F-9850-41B4D51B34BB}" type="datetimeFigureOut">
               <a:rPr lang="en-US" smtClean="0"/>
-              <a:t>9/2/2024</a:t>
+              <a:t>9/11/2024</a:t>
             </a:fld>
             <a:endParaRPr lang="en-US"/>
           </a:p>
@@ -966,7 +966,7 @@
           <a:p>
             <a:fld id="{DFE3A07B-5B2D-42B1-B20E-B0E2AA27ACE0}" type="datetimeFigureOut">
               <a:rPr lang="en-US" smtClean="0"/>
-              <a:t>9/2/2024</a:t>
+              <a:t>9/11/2024</a:t>
             </a:fld>
             <a:endParaRPr lang="en-US"/>
           </a:p>
@@ -1164,7 +1164,7 @@
           <a:p>
             <a:fld id="{DFE3A07B-5B2D-42B1-B20E-B0E2AA27ACE0}" type="datetimeFigureOut">
               <a:rPr lang="en-US" smtClean="0"/>
-              <a:t>9/2/2024</a:t>
+              <a:t>9/11/2024</a:t>
             </a:fld>
             <a:endParaRPr lang="en-US"/>
           </a:p>
@@ -1372,7 +1372,7 @@
           <a:p>
             <a:fld id="{DFE3A07B-5B2D-42B1-B20E-B0E2AA27ACE0}" type="datetimeFigureOut">
               <a:rPr lang="en-US" smtClean="0"/>
-              <a:t>9/2/2024</a:t>
+              <a:t>9/11/2024</a:t>
             </a:fld>
             <a:endParaRPr lang="en-US"/>
           </a:p>
@@ -1485,7 +1485,7 @@
           <a:p>
             <a:fld id="{CFE5869F-C3C3-445F-9007-9035FE739F6C}" type="datetime1">
               <a:rPr lang="en-GB" smtClean="0"/>
-              <a:t>02/09/2024</a:t>
+              <a:t>11/09/2024</a:t>
             </a:fld>
             <a:endParaRPr lang="en-GB" dirty="0"/>
           </a:p>
@@ -2029,7 +2029,7 @@
           <a:p>
             <a:fld id="{DFE3A07B-5B2D-42B1-B20E-B0E2AA27ACE0}" type="datetimeFigureOut">
               <a:rPr lang="en-US" smtClean="0"/>
-              <a:t>9/2/2024</a:t>
+              <a:t>9/11/2024</a:t>
             </a:fld>
             <a:endParaRPr lang="en-US"/>
           </a:p>
@@ -2304,7 +2304,7 @@
           <a:p>
             <a:fld id="{DFE3A07B-5B2D-42B1-B20E-B0E2AA27ACE0}" type="datetimeFigureOut">
               <a:rPr lang="en-US" smtClean="0"/>
-              <a:t>9/2/2024</a:t>
+              <a:t>9/11/2024</a:t>
             </a:fld>
             <a:endParaRPr lang="en-US"/>
           </a:p>
@@ -2569,7 +2569,7 @@
           <a:p>
             <a:fld id="{DFE3A07B-5B2D-42B1-B20E-B0E2AA27ACE0}" type="datetimeFigureOut">
               <a:rPr lang="en-US" smtClean="0"/>
-              <a:t>9/2/2024</a:t>
+              <a:t>9/11/2024</a:t>
             </a:fld>
             <a:endParaRPr lang="en-US"/>
           </a:p>
@@ -2981,7 +2981,7 @@
           <a:p>
             <a:fld id="{DFE3A07B-5B2D-42B1-B20E-B0E2AA27ACE0}" type="datetimeFigureOut">
               <a:rPr lang="en-US" smtClean="0"/>
-              <a:t>9/2/2024</a:t>
+              <a:t>9/11/2024</a:t>
             </a:fld>
             <a:endParaRPr lang="en-US"/>
           </a:p>
@@ -3122,7 +3122,7 @@
           <a:p>
             <a:fld id="{DFE3A07B-5B2D-42B1-B20E-B0E2AA27ACE0}" type="datetimeFigureOut">
               <a:rPr lang="en-US" smtClean="0"/>
-              <a:t>9/2/2024</a:t>
+              <a:t>9/11/2024</a:t>
             </a:fld>
             <a:endParaRPr lang="en-US"/>
           </a:p>
@@ -3235,7 +3235,7 @@
           <a:p>
             <a:fld id="{DFE3A07B-5B2D-42B1-B20E-B0E2AA27ACE0}" type="datetimeFigureOut">
               <a:rPr lang="en-US" smtClean="0"/>
-              <a:t>9/2/2024</a:t>
+              <a:t>9/11/2024</a:t>
             </a:fld>
             <a:endParaRPr lang="en-US"/>
           </a:p>
@@ -3546,7 +3546,7 @@
           <a:p>
             <a:fld id="{DFE3A07B-5B2D-42B1-B20E-B0E2AA27ACE0}" type="datetimeFigureOut">
               <a:rPr lang="en-US" smtClean="0"/>
-              <a:t>9/2/2024</a:t>
+              <a:t>9/11/2024</a:t>
             </a:fld>
             <a:endParaRPr lang="en-US"/>
           </a:p>
@@ -3834,7 +3834,7 @@
           <a:p>
             <a:fld id="{DFE3A07B-5B2D-42B1-B20E-B0E2AA27ACE0}" type="datetimeFigureOut">
               <a:rPr lang="en-US" smtClean="0"/>
-              <a:t>9/2/2024</a:t>
+              <a:t>9/11/2024</a:t>
             </a:fld>
             <a:endParaRPr lang="en-US"/>
           </a:p>
@@ -4075,7 +4075,7 @@
           <a:p>
             <a:fld id="{DFE3A07B-5B2D-42B1-B20E-B0E2AA27ACE0}" type="datetimeFigureOut">
               <a:rPr lang="en-US" smtClean="0"/>
-              <a:t>9/2/2024</a:t>
+              <a:t>9/11/2024</a:t>
             </a:fld>
             <a:endParaRPr lang="en-US"/>
           </a:p>
@@ -4572,7 +4572,7 @@
         <p:spPr>
           <a:xfrm>
             <a:off x="3577046" y="3122611"/>
-            <a:ext cx="7315200" cy="461665"/>
+            <a:ext cx="7315200" cy="1200329"/>
           </a:xfrm>
           <a:prstGeom prst="rect">
             <a:avLst/>
@@ -4594,6 +4594,21 @@
                 <a:cs typeface="Segoe UI Light"/>
               </a:rPr>
               <a:t>Semantic Kernel Hackathon</a:t>
+            </a:r>
+          </a:p>
+          <a:p>
+            <a:endParaRPr lang="en-US" sz="2400" b="1" dirty="0">
+              <a:latin typeface="Segoe UI Light"/>
+              <a:cs typeface="Segoe UI Light"/>
+            </a:endParaRPr>
+          </a:p>
+          <a:p>
+            <a:r>
+              <a:rPr lang="en-US" sz="2400" b="1" dirty="0">
+                <a:latin typeface="Segoe UI Light"/>
+                <a:cs typeface="Segoe UI Light"/>
+              </a:rPr>
+              <a:t>TEAM 5ive</a:t>
             </a:r>
           </a:p>
         </p:txBody>
@@ -4722,8 +4737,8 @@
         </p:nvSpPr>
         <p:spPr>
           <a:xfrm>
-            <a:off x="2076315" y="2439002"/>
-            <a:ext cx="6240986" cy="1684283"/>
+            <a:off x="2076314" y="2439002"/>
+            <a:ext cx="8388486" cy="1684283"/>
           </a:xfrm>
           <a:prstGeom prst="rect">
             <a:avLst/>
@@ -4759,13 +4774,13 @@
               </a:lnSpc>
             </a:pPr>
             <a:r>
-              <a:rPr lang="en-US" sz="2000">
+              <a:rPr lang="en-US" sz="2000" dirty="0">
                 <a:latin typeface="Segoe UI"/>
                 <a:cs typeface="Segoe UI"/>
               </a:rPr>
-              <a:t>We empathized with ___________________________________</a:t>
-            </a:r>
-            <a:endParaRPr lang="en-US" sz="2000"/>
+              <a:t>We empathized with:</a:t>
+            </a:r>
+            <a:endParaRPr lang="en-US" sz="2000" dirty="0"/>
           </a:p>
           <a:p>
             <a:pPr marL="342900" indent="-342900" algn="l">
@@ -4776,13 +4791,13 @@
               <a:buChar char="•"/>
             </a:pPr>
             <a:r>
-              <a:rPr lang="en-US" sz="2000">
+              <a:rPr lang="en-US" sz="2000" dirty="0">
                 <a:latin typeface="Segoe UI"/>
                 <a:cs typeface="Segoe UI"/>
               </a:rPr>
-              <a:t>&lt;Insert 2-3 insights you learned&gt;</a:t>
-            </a:r>
-            <a:endParaRPr lang="en-US" sz="2000"/>
+              <a:t>People who find medication confusing</a:t>
+            </a:r>
+            <a:endParaRPr lang="en-US" sz="2000" dirty="0"/>
           </a:p>
           <a:p>
             <a:pPr marL="342900" indent="-342900" algn="l">
@@ -4793,11 +4808,11 @@
               <a:buChar char="•"/>
             </a:pPr>
             <a:r>
-              <a:rPr lang="en-US" sz="2000">
+              <a:rPr lang="en-US" sz="2000" dirty="0">
                 <a:latin typeface="Segoe UI"/>
                 <a:cs typeface="Segoe UI"/>
               </a:rPr>
-              <a:t>&lt;Insert 2-3 insights you learned&gt;</a:t>
+              <a:t>The fact that there are so many medication options and pricing</a:t>
             </a:r>
           </a:p>
           <a:p>
@@ -4809,25 +4824,12 @@
               <a:buChar char="•"/>
             </a:pPr>
             <a:r>
-              <a:rPr lang="en-US" sz="2000">
+              <a:rPr lang="en-US" sz="2000" dirty="0">
                 <a:latin typeface="Segoe UI"/>
                 <a:cs typeface="Segoe UI"/>
               </a:rPr>
-              <a:t>&lt;Insert 2-3 insights you learned&gt;</a:t>
-            </a:r>
-          </a:p>
-          <a:p>
-            <a:pPr marL="342900" indent="-342900" algn="l">
-              <a:lnSpc>
-                <a:spcPct val="100000"/>
-              </a:lnSpc>
-              <a:buFont typeface="Arial"/>
-              <a:buChar char="•"/>
-            </a:pPr>
-            <a:endParaRPr lang="en-US" sz="2000">
-              <a:latin typeface="Segoe UI"/>
-              <a:cs typeface="Segoe UI"/>
-            </a:endParaRPr>
+              <a:t>Someone who’s pregnant, on other meds, needs to drive (or all three!)</a:t>
+            </a:r>
           </a:p>
           <a:p>
             <a:pPr algn="l">
@@ -4835,7 +4837,7 @@
                 <a:spcPct val="100000"/>
               </a:lnSpc>
             </a:pPr>
-            <a:endParaRPr lang="en-US" sz="2000">
+            <a:endParaRPr lang="en-US" sz="2000" dirty="0">
               <a:latin typeface="Segoe UI"/>
               <a:cs typeface="Segoe UI"/>
             </a:endParaRPr>
@@ -4846,7 +4848,7 @@
                 <a:spcPct val="100000"/>
               </a:lnSpc>
             </a:pPr>
-            <a:endParaRPr lang="en-US" sz="2000">
+            <a:endParaRPr lang="en-US" sz="2000" dirty="0">
               <a:latin typeface="Segoe UI"/>
               <a:cs typeface="Segoe UI"/>
             </a:endParaRPr>
@@ -5288,8 +5290,8 @@
         </p:nvSpPr>
         <p:spPr>
           <a:xfrm>
-            <a:off x="2076315" y="4300796"/>
-            <a:ext cx="6240986" cy="2281313"/>
+            <a:off x="2076314" y="4300796"/>
+            <a:ext cx="9311353" cy="1956071"/>
           </a:xfrm>
           <a:prstGeom prst="rect">
             <a:avLst/>
@@ -5325,28 +5327,13 @@
               </a:lnSpc>
             </a:pPr>
             <a:r>
-              <a:rPr lang="en-US" sz="2000">
+              <a:rPr lang="en-US" sz="2000" dirty="0">
                 <a:latin typeface="Segoe UI"/>
                 <a:cs typeface="Segoe UI"/>
               </a:rPr>
               <a:t>Our problem statement:  </a:t>
             </a:r>
-            <a:endParaRPr lang="en-US" sz="2000"/>
-          </a:p>
-          <a:p>
-            <a:pPr algn="l">
-              <a:lnSpc>
-                <a:spcPct val="100000"/>
-              </a:lnSpc>
-            </a:pPr>
-            <a:r>
-              <a:rPr lang="en-US" sz="2000">
-                <a:latin typeface="Segoe UI"/>
-                <a:cs typeface="Segoe UI"/>
-              </a:rPr>
-              <a:t>_________________________________________________________</a:t>
-            </a:r>
-            <a:endParaRPr lang="en-US" sz="2000"/>
+            <a:endParaRPr lang="en-US" sz="2000" dirty="0"/>
           </a:p>
           <a:p>
             <a:pPr marL="342900" indent="-342900" algn="l">
@@ -5357,11 +5344,11 @@
               <a:buChar char="•"/>
             </a:pPr>
             <a:r>
-              <a:rPr lang="en-US" sz="2000">
+              <a:rPr lang="en-US" sz="2000" dirty="0">
                 <a:latin typeface="Segoe UI"/>
                 <a:cs typeface="Segoe UI"/>
               </a:rPr>
-              <a:t>&lt;Insert 2-3 needs you defined&gt;</a:t>
+              <a:t>Medical advice is a scarce resource, not always available at short notice</a:t>
             </a:r>
           </a:p>
           <a:p>
@@ -5373,11 +5360,11 @@
               <a:buChar char="•"/>
             </a:pPr>
             <a:r>
-              <a:rPr lang="en-US" sz="2000">
+              <a:rPr lang="en-US" sz="2000" dirty="0">
                 <a:latin typeface="Segoe UI"/>
                 <a:cs typeface="Segoe UI"/>
               </a:rPr>
-              <a:t>&lt;Insert 2-3 needs you defined&gt;</a:t>
+              <a:t>Not everyone is comfortable asking for advice (in a queue for example)</a:t>
             </a:r>
           </a:p>
           <a:p>
@@ -5389,11 +5376,27 @@
               <a:buChar char="•"/>
             </a:pPr>
             <a:r>
-              <a:rPr lang="en-US" sz="2000">
+              <a:rPr lang="en-US" sz="2000" dirty="0">
                 <a:latin typeface="Segoe UI"/>
                 <a:cs typeface="Segoe UI"/>
               </a:rPr>
-              <a:t>&lt;Insert 2-3 needs you defined&gt;</a:t>
+              <a:t>Communication barriers e.g. not speaking the language well enough</a:t>
+            </a:r>
+          </a:p>
+          <a:p>
+            <a:pPr marL="342900" indent="-342900" algn="l">
+              <a:lnSpc>
+                <a:spcPct val="100000"/>
+              </a:lnSpc>
+              <a:buFont typeface="Arial,Sans-Serif"/>
+              <a:buChar char="•"/>
+            </a:pPr>
+            <a:r>
+              <a:rPr lang="en-US" sz="2000" dirty="0">
+                <a:latin typeface="Segoe UI"/>
+                <a:cs typeface="Segoe UI"/>
+              </a:rPr>
+              <a:t>In another location e.g. on holiday abroad</a:t>
             </a:r>
           </a:p>
           <a:p>
@@ -5402,7 +5405,7 @@
                 <a:spcPct val="100000"/>
               </a:lnSpc>
             </a:pPr>
-            <a:endParaRPr lang="en-US" sz="2000">
+            <a:endParaRPr lang="en-US" sz="2000" dirty="0">
               <a:latin typeface="Segoe UI"/>
               <a:cs typeface="Segoe UI"/>
             </a:endParaRPr>
@@ -5413,7 +5416,7 @@
                 <a:spcPct val="100000"/>
               </a:lnSpc>
             </a:pPr>
-            <a:endParaRPr lang="en-US" sz="2000">
+            <a:endParaRPr lang="en-US" sz="2000" dirty="0">
               <a:latin typeface="Segoe UI"/>
               <a:cs typeface="Segoe UI"/>
             </a:endParaRPr>
@@ -5587,7 +5590,7 @@
         <p:spPr>
           <a:xfrm>
             <a:off x="2076315" y="2211188"/>
-            <a:ext cx="6240986" cy="1212943"/>
+            <a:ext cx="9116618" cy="1683479"/>
           </a:xfrm>
           <a:prstGeom prst="rect">
             <a:avLst/>
@@ -5623,13 +5626,13 @@
               </a:lnSpc>
             </a:pPr>
             <a:r>
-              <a:rPr lang="en-US" sz="2000">
+              <a:rPr lang="en-US" sz="2000" dirty="0">
                 <a:latin typeface="Segoe UI"/>
                 <a:cs typeface="Segoe UI"/>
               </a:rPr>
-              <a:t>Solutions we considered</a:t>
-            </a:r>
-            <a:endParaRPr lang="en-US" sz="2000">
+              <a:t>Solutions we considered:</a:t>
+            </a:r>
+            <a:endParaRPr lang="en-US" sz="2000" dirty="0">
               <a:latin typeface="Aptos Display" panose="02110004020202020204"/>
               <a:cs typeface="Segoe UI"/>
             </a:endParaRPr>
@@ -5643,13 +5646,13 @@
               <a:buChar char="•"/>
             </a:pPr>
             <a:r>
-              <a:rPr lang="en-US" sz="2000">
+              <a:rPr lang="en-US" sz="2000" dirty="0">
                 <a:latin typeface="Segoe UI"/>
                 <a:cs typeface="Segoe UI"/>
               </a:rPr>
-              <a:t>&lt;Insert 1-2 solutions you considered&gt;</a:t>
-            </a:r>
-            <a:endParaRPr lang="en-US" sz="2000"/>
+              <a:t>Using plain APIs, but not suitable for aggregating information for sensible conclusions</a:t>
+            </a:r>
+            <a:endParaRPr lang="en-US" sz="2000" dirty="0"/>
           </a:p>
           <a:p>
             <a:pPr marL="342900" indent="-342900" algn="l">
@@ -5660,13 +5663,13 @@
               <a:buChar char="•"/>
             </a:pPr>
             <a:r>
-              <a:rPr lang="en-US" sz="2000">
+              <a:rPr lang="en-US" sz="2000" dirty="0">
                 <a:latin typeface="Segoe UI"/>
                 <a:cs typeface="Segoe UI"/>
               </a:rPr>
-              <a:t>&lt;Insert 1-2 solutions you considered&gt;</a:t>
-            </a:r>
-            <a:endParaRPr lang="en-US"/>
+              <a:t>Using pricing information to provide cheaper options, but is actually a minefield</a:t>
+            </a:r>
+            <a:endParaRPr lang="en-US" dirty="0"/>
           </a:p>
           <a:p>
             <a:pPr marL="342900" indent="-342900" algn="l">
@@ -5676,7 +5679,7 @@
               <a:buFont typeface="Arial"/>
               <a:buChar char="•"/>
             </a:pPr>
-            <a:endParaRPr lang="en-US" sz="2000">
+            <a:endParaRPr lang="en-US" sz="2000" dirty="0">
               <a:latin typeface="Segoe UI"/>
               <a:cs typeface="Segoe UI"/>
             </a:endParaRPr>
@@ -5687,7 +5690,7 @@
                 <a:spcPct val="100000"/>
               </a:lnSpc>
             </a:pPr>
-            <a:endParaRPr lang="en-US" sz="2000">
+            <a:endParaRPr lang="en-US" sz="2000" dirty="0">
               <a:latin typeface="Segoe UI"/>
               <a:cs typeface="Segoe UI"/>
             </a:endParaRPr>
@@ -5698,7 +5701,7 @@
                 <a:spcPct val="100000"/>
               </a:lnSpc>
             </a:pPr>
-            <a:endParaRPr lang="en-US" sz="2000">
+            <a:endParaRPr lang="en-US" sz="2000" dirty="0">
               <a:latin typeface="Segoe UI"/>
               <a:cs typeface="Segoe UI"/>
             </a:endParaRPr>

</xml_diff>

<commit_message>
Modified team feedback deck
</commit_message>
<xml_diff>
--- a/Team Feedback.pptx
+++ b/Team Feedback.pptx
@@ -121,101 +121,9 @@
 <file path=ppt/revisionInfo.xml><?xml version="1.0" encoding="utf-8"?>
 <p1510:revInfo xmlns:a="http://schemas.openxmlformats.org/drawingml/2006/main" xmlns:r="http://schemas.openxmlformats.org/officeDocument/2006/relationships" xmlns:p1510="http://schemas.microsoft.com/office/powerpoint/2015/10/main">
   <p1510:revLst>
-    <p1510:client id="{F342C813-4AAC-4EF8-9B6B-B581070981D2}" v="2" dt="2024-09-02T11:00:12.206"/>
+    <p1510:client id="{028FBDAC-031C-D977-E95D-39CD15662288}" v="136" dt="2024-09-11T15:05:41.403"/>
   </p1510:revLst>
 </p1510:revInfo>
-</file>
-
-<file path=ppt/changesInfos/changesInfo1.xml><?xml version="1.0" encoding="utf-8"?>
-<pc:chgInfo xmlns:a="http://schemas.openxmlformats.org/drawingml/2006/main" xmlns:r="http://schemas.openxmlformats.org/officeDocument/2006/relationships" xmlns:ac="http://schemas.microsoft.com/office/drawing/2013/main/command" xmlns:pc="http://schemas.microsoft.com/office/powerpoint/2013/main/command">
-  <pc:docChgLst>
-    <pc:chgData name="Jay Gregory" userId="c77be2b5-21c4-43b2-a59c-18fda2f5d0dd" providerId="ADAL" clId="{F342C813-4AAC-4EF8-9B6B-B581070981D2}"/>
-    <pc:docChg chg="undo custSel addSld delSld modSld">
-      <pc:chgData name="Jay Gregory" userId="c77be2b5-21c4-43b2-a59c-18fda2f5d0dd" providerId="ADAL" clId="{F342C813-4AAC-4EF8-9B6B-B581070981D2}" dt="2024-09-02T11:00:31.425" v="25" actId="47"/>
-      <pc:docMkLst>
-        <pc:docMk/>
-      </pc:docMkLst>
-      <pc:sldChg chg="add del">
-        <pc:chgData name="Jay Gregory" userId="c77be2b5-21c4-43b2-a59c-18fda2f5d0dd" providerId="ADAL" clId="{F342C813-4AAC-4EF8-9B6B-B581070981D2}" dt="2024-09-02T11:00:31.425" v="25" actId="47"/>
-        <pc:sldMkLst>
-          <pc:docMk/>
-          <pc:sldMk cId="1067561452" sldId="343"/>
-        </pc:sldMkLst>
-      </pc:sldChg>
-      <pc:sldChg chg="addSp delSp modSp mod modClrScheme chgLayout">
-        <pc:chgData name="Jay Gregory" userId="c77be2b5-21c4-43b2-a59c-18fda2f5d0dd" providerId="ADAL" clId="{F342C813-4AAC-4EF8-9B6B-B581070981D2}" dt="2024-09-02T11:00:22.725" v="24" actId="1076"/>
-        <pc:sldMkLst>
-          <pc:docMk/>
-          <pc:sldMk cId="246825576" sldId="349"/>
-        </pc:sldMkLst>
-        <pc:spChg chg="del mod ord">
-          <ac:chgData name="Jay Gregory" userId="c77be2b5-21c4-43b2-a59c-18fda2f5d0dd" providerId="ADAL" clId="{F342C813-4AAC-4EF8-9B6B-B581070981D2}" dt="2024-09-02T11:00:08.360" v="6" actId="478"/>
-          <ac:spMkLst>
-            <pc:docMk/>
-            <pc:sldMk cId="246825576" sldId="349"/>
-            <ac:spMk id="2" creationId="{01A02949-A6D5-4C93-9AA8-B4481E6DCA12}"/>
-          </ac:spMkLst>
-        </pc:spChg>
-        <pc:spChg chg="del">
-          <ac:chgData name="Jay Gregory" userId="c77be2b5-21c4-43b2-a59c-18fda2f5d0dd" providerId="ADAL" clId="{F342C813-4AAC-4EF8-9B6B-B581070981D2}" dt="2024-09-02T11:00:08.360" v="6" actId="478"/>
-          <ac:spMkLst>
-            <pc:docMk/>
-            <pc:sldMk cId="246825576" sldId="349"/>
-            <ac:spMk id="3" creationId="{B6F87066-BAD2-FF75-0975-0C5DB0A9CF5A}"/>
-          </ac:spMkLst>
-        </pc:spChg>
-        <pc:spChg chg="mod ord">
-          <ac:chgData name="Jay Gregory" userId="c77be2b5-21c4-43b2-a59c-18fda2f5d0dd" providerId="ADAL" clId="{F342C813-4AAC-4EF8-9B6B-B581070981D2}" dt="2024-09-02T11:00:04.969" v="4" actId="700"/>
-          <ac:spMkLst>
-            <pc:docMk/>
-            <pc:sldMk cId="246825576" sldId="349"/>
-            <ac:spMk id="4" creationId="{74A7A3AB-6738-46F4-945D-2CEB57FE8B6F}"/>
-          </ac:spMkLst>
-        </pc:spChg>
-        <pc:spChg chg="add del mod ord">
-          <ac:chgData name="Jay Gregory" userId="c77be2b5-21c4-43b2-a59c-18fda2f5d0dd" providerId="ADAL" clId="{F342C813-4AAC-4EF8-9B6B-B581070981D2}" dt="2024-09-02T10:59:54.386" v="3" actId="700"/>
-          <ac:spMkLst>
-            <pc:docMk/>
-            <pc:sldMk cId="246825576" sldId="349"/>
-            <ac:spMk id="5" creationId="{51BB6814-BA02-8D92-64AF-2BEAF5C23EA6}"/>
-          </ac:spMkLst>
-        </pc:spChg>
-        <pc:spChg chg="add del mod ord">
-          <ac:chgData name="Jay Gregory" userId="c77be2b5-21c4-43b2-a59c-18fda2f5d0dd" providerId="ADAL" clId="{F342C813-4AAC-4EF8-9B6B-B581070981D2}" dt="2024-09-02T11:00:08.360" v="6" actId="478"/>
-          <ac:spMkLst>
-            <pc:docMk/>
-            <pc:sldMk cId="246825576" sldId="349"/>
-            <ac:spMk id="6" creationId="{973CDA15-8073-F2A9-BA30-723488E46DC1}"/>
-          </ac:spMkLst>
-        </pc:spChg>
-        <pc:spChg chg="add mod">
-          <ac:chgData name="Jay Gregory" userId="c77be2b5-21c4-43b2-a59c-18fda2f5d0dd" providerId="ADAL" clId="{F342C813-4AAC-4EF8-9B6B-B581070981D2}" dt="2024-09-02T11:00:16.830" v="21" actId="20577"/>
-          <ac:spMkLst>
-            <pc:docMk/>
-            <pc:sldMk cId="246825576" sldId="349"/>
-            <ac:spMk id="8" creationId="{A03721E4-79B1-7364-9C71-9F9C69725FB9}"/>
-          </ac:spMkLst>
-        </pc:spChg>
-        <pc:spChg chg="add del mod">
-          <ac:chgData name="Jay Gregory" userId="c77be2b5-21c4-43b2-a59c-18fda2f5d0dd" providerId="ADAL" clId="{F342C813-4AAC-4EF8-9B6B-B581070981D2}" dt="2024-09-02T11:00:20.328" v="22" actId="478"/>
-          <ac:spMkLst>
-            <pc:docMk/>
-            <pc:sldMk cId="246825576" sldId="349"/>
-            <ac:spMk id="9" creationId="{B54204B4-F48B-A0DA-4FFB-FEEB05CBF655}"/>
-          </ac:spMkLst>
-        </pc:spChg>
-        <pc:spChg chg="add mod">
-          <ac:chgData name="Jay Gregory" userId="c77be2b5-21c4-43b2-a59c-18fda2f5d0dd" providerId="ADAL" clId="{F342C813-4AAC-4EF8-9B6B-B581070981D2}" dt="2024-09-02T11:00:22.725" v="24" actId="1076"/>
-          <ac:spMkLst>
-            <pc:docMk/>
-            <pc:sldMk cId="246825576" sldId="349"/>
-            <ac:spMk id="10" creationId="{A364399B-DC5C-EEF4-39FB-B18B12EA3CF3}"/>
-          </ac:spMkLst>
-        </pc:spChg>
-      </pc:sldChg>
-    </pc:docChg>
-  </pc:docChgLst>
-</pc:chgInfo>
 </file>
 
 <file path=ppt/notesMasters/notesMaster1.xml><?xml version="1.0" encoding="utf-8"?>
@@ -4778,7 +4686,21 @@
                 <a:latin typeface="Segoe UI"/>
                 <a:cs typeface="Segoe UI"/>
               </a:rPr>
-              <a:t>We empathized with:</a:t>
+              <a:t>We </a:t>
+            </a:r>
+            <a:r>
+              <a:rPr lang="en-US" sz="2000" dirty="0" err="1">
+                <a:latin typeface="Segoe UI"/>
+                <a:cs typeface="Segoe UI"/>
+              </a:rPr>
+              <a:t>empathised</a:t>
+            </a:r>
+            <a:r>
+              <a:rPr lang="en-US" sz="2000" dirty="0">
+                <a:latin typeface="Segoe UI"/>
+                <a:cs typeface="Segoe UI"/>
+              </a:rPr>
+              <a:t> with:</a:t>
             </a:r>
             <a:endParaRPr lang="en-US" sz="2000" dirty="0"/>
           </a:p>
@@ -4812,23 +4734,21 @@
                 <a:latin typeface="Segoe UI"/>
                 <a:cs typeface="Segoe UI"/>
               </a:rPr>
-              <a:t>The fact that there are so many medication options and pricing</a:t>
-            </a:r>
-          </a:p>
-          <a:p>
-            <a:pPr marL="342900" indent="-342900" algn="l">
-              <a:lnSpc>
-                <a:spcPct val="100000"/>
-              </a:lnSpc>
-              <a:buFont typeface="Arial"/>
-              <a:buChar char="•"/>
-            </a:pPr>
+              <a:t>Someone who has specific considerations when taking medication </a:t>
+            </a:r>
+            <a:r>
+              <a:rPr lang="en-US" sz="2000" dirty="0" err="1">
+                <a:latin typeface="Segoe UI"/>
+                <a:cs typeface="Segoe UI"/>
+              </a:rPr>
+              <a:t>ie</a:t>
+            </a:r>
             <a:r>
               <a:rPr lang="en-US" sz="2000" dirty="0">
                 <a:latin typeface="Segoe UI"/>
                 <a:cs typeface="Segoe UI"/>
               </a:rPr>
-              <a:t>Someone who’s pregnant, on other meds, needs to drive (or all three!)</a:t>
+              <a:t> pregnancy, current medications, requires non-drowsy</a:t>
             </a:r>
           </a:p>
           <a:p>
@@ -5396,7 +5316,7 @@
                 <a:latin typeface="Segoe UI"/>
                 <a:cs typeface="Segoe UI"/>
               </a:rPr>
-              <a:t>In another location e.g. on holiday abroad</a:t>
+              <a:t>Numerous medication options and pricing</a:t>
             </a:r>
           </a:p>
           <a:p>
@@ -5963,8 +5883,8 @@
         </p:nvSpPr>
         <p:spPr>
           <a:xfrm>
-            <a:off x="2076315" y="4072982"/>
-            <a:ext cx="6240986" cy="2281313"/>
+            <a:off x="2076315" y="4085272"/>
+            <a:ext cx="9104631" cy="2269023"/>
           </a:xfrm>
           <a:prstGeom prst="rect">
             <a:avLst/>
@@ -6000,13 +5920,13 @@
               </a:lnSpc>
             </a:pPr>
             <a:r>
-              <a:rPr lang="en-US" sz="2000">
+              <a:rPr lang="en-US" sz="2000" dirty="0">
                 <a:latin typeface="Segoe UI"/>
                 <a:cs typeface="Segoe UI"/>
               </a:rPr>
               <a:t>We created</a:t>
             </a:r>
-            <a:endParaRPr lang="en-US"/>
+            <a:endParaRPr lang="en-US" dirty="0"/>
           </a:p>
           <a:p>
             <a:pPr marL="342900" indent="-342900" algn="l">
@@ -6017,12 +5937,27 @@
               <a:buChar char="•"/>
             </a:pPr>
             <a:r>
+              <a:rPr lang="en-US" sz="2000" dirty="0">
+                <a:latin typeface="Segoe UI"/>
+                <a:cs typeface="Segoe UI"/>
+              </a:rPr>
+              <a:t>An AI interface which the user can 'talk' to, stating their symptoms. It will ask the user a serious of questions to determine their personal </a:t>
+            </a:r>
+            <a:r>
               <a:rPr lang="en-US" sz="2000">
                 <a:latin typeface="Segoe UI"/>
                 <a:cs typeface="Segoe UI"/>
               </a:rPr>
-              <a:t>&lt;Insert the solution to the problem&gt;</a:t>
-            </a:r>
+              <a:t>circumstances</a:t>
+            </a:r>
+            <a:r>
+              <a:rPr lang="en-US" sz="2000" dirty="0">
+                <a:latin typeface="Segoe UI"/>
+                <a:cs typeface="Segoe UI"/>
+              </a:rPr>
+              <a:t> to help determine the most suitable medication.</a:t>
+            </a:r>
+            <a:endParaRPr lang="en-US" dirty="0"/>
           </a:p>
           <a:p>
             <a:pPr algn="l">

</xml_diff>